<commit_message>
update dataflow images and slides.
</commit_message>
<xml_diff>
--- a/Frontend/AutoDiff/02.base_concept.pptx
+++ b/Frontend/AutoDiff/02.base_concept.pptx
@@ -390,7 +390,7 @@
               <a:pPr>
                 <a:defRPr/>
               </a:pPr>
-              <a:t>2022/9/20</a:t>
+              <a:t>2022/10/8</a:t>
             </a:fld>
             <a:endParaRPr lang="en-US" altLang="zh-CN"/>
           </a:p>
@@ -643,7 +643,7 @@
             <a:fld id="{C45443A1-D8F2-48CD-A659-3CEDBA8DF541}" type="datetimeFigureOut">
               <a:rPr lang="zh-CN" altLang="en-US" smtClean="0"/>
               <a:pPr/>
-              <a:t>2022/9/20</a:t>
+              <a:t>2022/10/8</a:t>
             </a:fld>
             <a:endParaRPr lang="zh-CN" altLang="en-US"/>
           </a:p>

</xml_diff>

<commit_message>
add inference of the AI system.
</commit_message>
<xml_diff>
--- a/Frontend/AutoDiff/02.base_concept.pptx
+++ b/Frontend/AutoDiff/02.base_concept.pptx
@@ -390,7 +390,7 @@
               <a:pPr>
                 <a:defRPr/>
               </a:pPr>
-              <a:t>2022/10/8</a:t>
+              <a:t>2023/1/6</a:t>
             </a:fld>
             <a:endParaRPr lang="en-US" altLang="zh-CN"/>
           </a:p>
@@ -643,7 +643,7 @@
             <a:fld id="{C45443A1-D8F2-48CD-A659-3CEDBA8DF541}" type="datetimeFigureOut">
               <a:rPr lang="zh-CN" altLang="en-US" smtClean="0"/>
               <a:pPr/>
-              <a:t>2022/10/8</a:t>
+              <a:t>2023/1/6</a:t>
             </a:fld>
             <a:endParaRPr lang="zh-CN" altLang="en-US"/>
           </a:p>
@@ -2893,7 +2893,13 @@
           <p:nvPr userDrawn="1"/>
         </p:nvPicPr>
         <p:blipFill>
-          <a:blip r:embed="rId3" cstate="print"/>
+          <a:blip r:embed="rId3" cstate="screen">
+            <a:extLst>
+              <a:ext uri="{28A0092B-C50C-407E-A947-70E740481C1C}">
+                <a14:useLocalDpi xmlns:a14="http://schemas.microsoft.com/office/drawing/2010/main"/>
+              </a:ext>
+            </a:extLst>
+          </a:blip>
           <a:srcRect/>
           <a:stretch>
             <a:fillRect/>
@@ -3176,7 +3182,7 @@
           <a:blip r:embed="rId4">
             <a:extLst>
               <a:ext uri="{28A0092B-C50C-407E-A947-70E740481C1C}">
-                <a14:useLocalDpi xmlns:a14="http://schemas.microsoft.com/office/drawing/2010/main" val="0"/>
+                <a14:useLocalDpi xmlns:a14="http://schemas.microsoft.com/office/drawing/2010/main"/>
               </a:ext>
             </a:extLst>
           </a:blip>
@@ -3657,7 +3663,7 @@
           <a:blip r:embed="rId3">
             <a:extLst>
               <a:ext uri="{28A0092B-C50C-407E-A947-70E740481C1C}">
-                <a14:useLocalDpi xmlns:a14="http://schemas.microsoft.com/office/drawing/2010/main" val="0"/>
+                <a14:useLocalDpi xmlns:a14="http://schemas.microsoft.com/office/drawing/2010/main"/>
               </a:ext>
             </a:extLst>
           </a:blip>
@@ -8344,7 +8350,7 @@
           <a:blip r:embed="rId5" cstate="print">
             <a:extLst>
               <a:ext uri="{28A0092B-C50C-407E-A947-70E740481C1C}">
-                <a14:useLocalDpi xmlns:a14="http://schemas.microsoft.com/office/drawing/2010/main" val="0"/>
+                <a14:useLocalDpi xmlns:a14="http://schemas.microsoft.com/office/drawing/2010/main"/>
               </a:ext>
             </a:extLst>
           </a:blip>
@@ -8405,10 +8411,10 @@
           <p:nvPr userDrawn="1"/>
         </p:nvPicPr>
         <p:blipFill>
-          <a:blip r:embed="rId6" cstate="print">
+          <a:blip r:embed="rId6" cstate="screen">
             <a:extLst>
               <a:ext uri="{28A0092B-C50C-407E-A947-70E740481C1C}">
-                <a14:useLocalDpi xmlns:a14="http://schemas.microsoft.com/office/drawing/2010/main" val="0"/>
+                <a14:useLocalDpi xmlns:a14="http://schemas.microsoft.com/office/drawing/2010/main"/>
               </a:ext>
             </a:extLst>
           </a:blip>
@@ -13565,7 +13571,7 @@
           <a:blip r:embed="rId5" cstate="print">
             <a:extLst>
               <a:ext uri="{28A0092B-C50C-407E-A947-70E740481C1C}">
-                <a14:useLocalDpi xmlns:a14="http://schemas.microsoft.com/office/drawing/2010/main" val="0"/>
+                <a14:useLocalDpi xmlns:a14="http://schemas.microsoft.com/office/drawing/2010/main"/>
               </a:ext>
             </a:extLst>
           </a:blip>
@@ -13626,10 +13632,10 @@
           <p:nvPr userDrawn="1"/>
         </p:nvPicPr>
         <p:blipFill>
-          <a:blip r:embed="rId6" cstate="print">
+          <a:blip r:embed="rId6" cstate="screen">
             <a:extLst>
               <a:ext uri="{28A0092B-C50C-407E-A947-70E740481C1C}">
-                <a14:useLocalDpi xmlns:a14="http://schemas.microsoft.com/office/drawing/2010/main" val="0"/>
+                <a14:useLocalDpi xmlns:a14="http://schemas.microsoft.com/office/drawing/2010/main"/>
               </a:ext>
             </a:extLst>
           </a:blip>
@@ -14269,10 +14275,10 @@
           <p:nvPr userDrawn="1"/>
         </p:nvPicPr>
         <p:blipFill>
-          <a:blip r:embed="rId4" cstate="print">
+          <a:blip r:embed="rId4" cstate="screen">
             <a:extLst>
               <a:ext uri="{28A0092B-C50C-407E-A947-70E740481C1C}">
-                <a14:useLocalDpi xmlns:a14="http://schemas.microsoft.com/office/drawing/2010/main" val="0"/>
+                <a14:useLocalDpi xmlns:a14="http://schemas.microsoft.com/office/drawing/2010/main"/>
               </a:ext>
             </a:extLst>
           </a:blip>
@@ -14891,10 +14897,10 @@
           <p:nvPr userDrawn="1"/>
         </p:nvPicPr>
         <p:blipFill>
-          <a:blip r:embed="rId3" cstate="print">
+          <a:blip r:embed="rId3" cstate="screen">
             <a:extLst>
               <a:ext uri="{28A0092B-C50C-407E-A947-70E740481C1C}">
-                <a14:useLocalDpi xmlns:a14="http://schemas.microsoft.com/office/drawing/2010/main" val="0"/>
+                <a14:useLocalDpi xmlns:a14="http://schemas.microsoft.com/office/drawing/2010/main"/>
               </a:ext>
             </a:extLst>
           </a:blip>
@@ -15387,7 +15393,7 @@
           <a:blip r:embed="rId3">
             <a:extLst>
               <a:ext uri="{28A0092B-C50C-407E-A947-70E740481C1C}">
-                <a14:useLocalDpi xmlns:a14="http://schemas.microsoft.com/office/drawing/2010/main" val="0"/>
+                <a14:useLocalDpi xmlns:a14="http://schemas.microsoft.com/office/drawing/2010/main"/>
               </a:ext>
             </a:extLst>
           </a:blip>
@@ -15642,7 +15648,7 @@
           <a:blip r:embed="rId5" cstate="print">
             <a:extLst>
               <a:ext uri="{28A0092B-C50C-407E-A947-70E740481C1C}">
-                <a14:useLocalDpi xmlns:a14="http://schemas.microsoft.com/office/drawing/2010/main" val="0"/>
+                <a14:useLocalDpi xmlns:a14="http://schemas.microsoft.com/office/drawing/2010/main"/>
               </a:ext>
             </a:extLst>
           </a:blip>
@@ -15706,7 +15712,7 @@
           <a:blip r:embed="rId6" cstate="print">
             <a:extLst>
               <a:ext uri="{28A0092B-C50C-407E-A947-70E740481C1C}">
-                <a14:useLocalDpi xmlns:a14="http://schemas.microsoft.com/office/drawing/2010/main" val="0"/>
+                <a14:useLocalDpi xmlns:a14="http://schemas.microsoft.com/office/drawing/2010/main"/>
               </a:ext>
             </a:extLst>
           </a:blip>
@@ -15767,10 +15773,10 @@
           <p:nvPr userDrawn="1"/>
         </p:nvPicPr>
         <p:blipFill>
-          <a:blip r:embed="rId7" cstate="print">
+          <a:blip r:embed="rId7" cstate="screen">
             <a:extLst>
               <a:ext uri="{28A0092B-C50C-407E-A947-70E740481C1C}">
-                <a14:useLocalDpi xmlns:a14="http://schemas.microsoft.com/office/drawing/2010/main" val="0"/>
+                <a14:useLocalDpi xmlns:a14="http://schemas.microsoft.com/office/drawing/2010/main"/>
               </a:ext>
             </a:extLst>
           </a:blip>
@@ -16320,10 +16326,10 @@
           <p:nvPr/>
         </p:nvPicPr>
         <p:blipFill>
-          <a:blip r:embed="rId2">
+          <a:blip r:embed="rId2" cstate="screen">
             <a:extLst>
               <a:ext uri="{28A0092B-C50C-407E-A947-70E740481C1C}">
-                <a14:useLocalDpi xmlns:a14="http://schemas.microsoft.com/office/drawing/2010/main" val="0"/>
+                <a14:useLocalDpi xmlns:a14="http://schemas.microsoft.com/office/drawing/2010/main"/>
               </a:ext>
             </a:extLst>
           </a:blip>
@@ -16807,10 +16813,10 @@
           <p:nvPr/>
         </p:nvPicPr>
         <p:blipFill>
-          <a:blip r:embed="rId2">
+          <a:blip r:embed="rId2" cstate="screen">
             <a:extLst>
               <a:ext uri="{28A0092B-C50C-407E-A947-70E740481C1C}">
-                <a14:useLocalDpi xmlns:a14="http://schemas.microsoft.com/office/drawing/2010/main" val="0"/>
+                <a14:useLocalDpi xmlns:a14="http://schemas.microsoft.com/office/drawing/2010/main"/>
               </a:ext>
             </a:extLst>
           </a:blip>

</xml_diff>